<commit_message>
Site updated: 2019-07-02 00:18:14
</commit_message>
<xml_diff>
--- a/ppt/abc132_e.pptx
+++ b/ppt/abc132_e.pptx
@@ -288,7 +288,7 @@
           <a:p>
             <a:fld id="{E90ED720-0104-4369-84BC-D37694168613}" type="datetimeFigureOut">
               <a:rPr kumimoji="1" lang="ja-JP" altLang="en-US" smtClean="0"/>
-              <a:t>2019/7/1</a:t>
+              <a:t>2019/7/2</a:t>
             </a:fld>
             <a:endParaRPr kumimoji="1" lang="ja-JP" altLang="en-US"/>
           </a:p>
@@ -485,7 +485,7 @@
           <a:p>
             <a:fld id="{E90ED720-0104-4369-84BC-D37694168613}" type="datetimeFigureOut">
               <a:rPr kumimoji="1" lang="ja-JP" altLang="en-US" smtClean="0"/>
-              <a:t>2019/7/1</a:t>
+              <a:t>2019/7/2</a:t>
             </a:fld>
             <a:endParaRPr kumimoji="1" lang="ja-JP" altLang="en-US"/>
           </a:p>
@@ -692,7 +692,7 @@
           <a:p>
             <a:fld id="{E90ED720-0104-4369-84BC-D37694168613}" type="datetimeFigureOut">
               <a:rPr kumimoji="1" lang="ja-JP" altLang="en-US" smtClean="0"/>
-              <a:t>2019/7/1</a:t>
+              <a:t>2019/7/2</a:t>
             </a:fld>
             <a:endParaRPr kumimoji="1" lang="ja-JP" altLang="en-US"/>
           </a:p>
@@ -889,7 +889,7 @@
           <a:p>
             <a:fld id="{E90ED720-0104-4369-84BC-D37694168613}" type="datetimeFigureOut">
               <a:rPr kumimoji="1" lang="ja-JP" altLang="en-US" smtClean="0"/>
-              <a:t>2019/7/1</a:t>
+              <a:t>2019/7/2</a:t>
             </a:fld>
             <a:endParaRPr kumimoji="1" lang="ja-JP" altLang="en-US"/>
           </a:p>
@@ -1130,7 +1130,7 @@
           <a:p>
             <a:fld id="{E90ED720-0104-4369-84BC-D37694168613}" type="datetimeFigureOut">
               <a:rPr kumimoji="1" lang="ja-JP" altLang="en-US" smtClean="0"/>
-              <a:t>2019/7/1</a:t>
+              <a:t>2019/7/2</a:t>
             </a:fld>
             <a:endParaRPr kumimoji="1" lang="ja-JP" altLang="en-US"/>
           </a:p>
@@ -1477,7 +1477,7 @@
           <a:p>
             <a:fld id="{E90ED720-0104-4369-84BC-D37694168613}" type="datetimeFigureOut">
               <a:rPr kumimoji="1" lang="ja-JP" altLang="en-US" smtClean="0"/>
-              <a:t>2019/7/1</a:t>
+              <a:t>2019/7/2</a:t>
             </a:fld>
             <a:endParaRPr kumimoji="1" lang="ja-JP" altLang="en-US"/>
           </a:p>
@@ -1958,7 +1958,7 @@
           <a:p>
             <a:fld id="{E90ED720-0104-4369-84BC-D37694168613}" type="datetimeFigureOut">
               <a:rPr kumimoji="1" lang="ja-JP" altLang="en-US" smtClean="0"/>
-              <a:t>2019/7/1</a:t>
+              <a:t>2019/7/2</a:t>
             </a:fld>
             <a:endParaRPr kumimoji="1" lang="ja-JP" altLang="en-US"/>
           </a:p>
@@ -2071,7 +2071,7 @@
           <a:p>
             <a:fld id="{E90ED720-0104-4369-84BC-D37694168613}" type="datetimeFigureOut">
               <a:rPr kumimoji="1" lang="ja-JP" altLang="en-US" smtClean="0"/>
-              <a:t>2019/7/1</a:t>
+              <a:t>2019/7/2</a:t>
             </a:fld>
             <a:endParaRPr kumimoji="1" lang="ja-JP" altLang="en-US"/>
           </a:p>
@@ -2161,7 +2161,7 @@
           <a:p>
             <a:fld id="{E90ED720-0104-4369-84BC-D37694168613}" type="datetimeFigureOut">
               <a:rPr kumimoji="1" lang="ja-JP" altLang="en-US" smtClean="0"/>
-              <a:t>2019/7/1</a:t>
+              <a:t>2019/7/2</a:t>
             </a:fld>
             <a:endParaRPr kumimoji="1" lang="ja-JP" altLang="en-US"/>
           </a:p>
@@ -2465,7 +2465,7 @@
           <a:p>
             <a:fld id="{E90ED720-0104-4369-84BC-D37694168613}" type="datetimeFigureOut">
               <a:rPr kumimoji="1" lang="ja-JP" altLang="en-US" smtClean="0"/>
-              <a:t>2019/7/1</a:t>
+              <a:t>2019/7/2</a:t>
             </a:fld>
             <a:endParaRPr kumimoji="1" lang="ja-JP" altLang="en-US"/>
           </a:p>
@@ -2713,7 +2713,7 @@
           <a:p>
             <a:fld id="{E90ED720-0104-4369-84BC-D37694168613}" type="datetimeFigureOut">
               <a:rPr kumimoji="1" lang="ja-JP" altLang="en-US" smtClean="0"/>
-              <a:t>2019/7/1</a:t>
+              <a:t>2019/7/2</a:t>
             </a:fld>
             <a:endParaRPr kumimoji="1" lang="ja-JP" altLang="en-US"/>
           </a:p>
@@ -2953,7 +2953,7 @@
           <a:p>
             <a:fld id="{E90ED720-0104-4369-84BC-D37694168613}" type="datetimeFigureOut">
               <a:rPr kumimoji="1" lang="ja-JP" altLang="en-US" smtClean="0"/>
-              <a:t>2019/7/1</a:t>
+              <a:t>2019/7/2</a:t>
             </a:fld>
             <a:endParaRPr kumimoji="1" lang="ja-JP" altLang="en-US"/>
           </a:p>
@@ -4646,6 +4646,322 @@
               <a:gd name="adj1" fmla="val -18988"/>
               <a:gd name="adj2" fmla="val 175081"/>
               <a:gd name="adj3" fmla="val 104997"/>
+            </a:avLst>
+          </a:prstGeom>
+          <a:ln>
+            <a:tailEnd type="arrow"/>
+          </a:ln>
+        </p:spPr>
+        <p:style>
+          <a:lnRef idx="1">
+            <a:schemeClr val="accent1"/>
+          </a:lnRef>
+          <a:fillRef idx="0">
+            <a:schemeClr val="accent1"/>
+          </a:fillRef>
+          <a:effectRef idx="0">
+            <a:schemeClr val="accent1"/>
+          </a:effectRef>
+          <a:fontRef idx="minor">
+            <a:schemeClr val="tx1"/>
+          </a:fontRef>
+        </p:style>
+      </p:cxnSp>
+      <p:sp>
+        <p:nvSpPr>
+          <p:cNvPr id="35" name="円/楕円 34"/>
+          <p:cNvSpPr/>
+          <p:nvPr/>
+        </p:nvSpPr>
+        <p:spPr>
+          <a:xfrm>
+            <a:off x="4624416" y="1843180"/>
+            <a:ext cx="504056" cy="504056"/>
+          </a:xfrm>
+          <a:prstGeom prst="ellipse">
+            <a:avLst/>
+          </a:prstGeom>
+        </p:spPr>
+        <p:style>
+          <a:lnRef idx="2">
+            <a:schemeClr val="accent2"/>
+          </a:lnRef>
+          <a:fillRef idx="1">
+            <a:schemeClr val="lt1"/>
+          </a:fillRef>
+          <a:effectRef idx="0">
+            <a:schemeClr val="accent2"/>
+          </a:effectRef>
+          <a:fontRef idx="minor">
+            <a:schemeClr val="dk1"/>
+          </a:fontRef>
+        </p:style>
+        <p:txBody>
+          <a:bodyPr rtlCol="0" anchor="ctr"/>
+          <a:lstStyle/>
+          <a:p>
+            <a:pPr algn="ctr"/>
+            <a:r>
+              <a:rPr lang="en-US" altLang="ja-JP" sz="800" dirty="0" smtClean="0"/>
+              <a:t>1</a:t>
+            </a:r>
+            <a:endParaRPr lang="en-US" altLang="ja-JP" sz="800" dirty="0" smtClean="0"/>
+          </a:p>
+        </p:txBody>
+      </p:sp>
+      <p:sp>
+        <p:nvSpPr>
+          <p:cNvPr id="36" name="円/楕円 35"/>
+          <p:cNvSpPr/>
+          <p:nvPr/>
+        </p:nvSpPr>
+        <p:spPr>
+          <a:xfrm>
+            <a:off x="6660130" y="1843180"/>
+            <a:ext cx="504056" cy="504056"/>
+          </a:xfrm>
+          <a:prstGeom prst="ellipse">
+            <a:avLst/>
+          </a:prstGeom>
+        </p:spPr>
+        <p:style>
+          <a:lnRef idx="2">
+            <a:schemeClr val="accent2"/>
+          </a:lnRef>
+          <a:fillRef idx="1">
+            <a:schemeClr val="lt1"/>
+          </a:fillRef>
+          <a:effectRef idx="0">
+            <a:schemeClr val="accent2"/>
+          </a:effectRef>
+          <a:fontRef idx="minor">
+            <a:schemeClr val="dk1"/>
+          </a:fontRef>
+        </p:style>
+        <p:txBody>
+          <a:bodyPr rtlCol="0" anchor="ctr"/>
+          <a:lstStyle/>
+          <a:p>
+            <a:pPr algn="ctr"/>
+            <a:r>
+              <a:rPr lang="en-US" altLang="ja-JP" sz="800" dirty="0"/>
+              <a:t>3</a:t>
+            </a:r>
+            <a:endParaRPr lang="en-US" altLang="ja-JP" sz="800" dirty="0" smtClean="0"/>
+          </a:p>
+        </p:txBody>
+      </p:sp>
+      <p:sp>
+        <p:nvSpPr>
+          <p:cNvPr id="37" name="円/楕円 36"/>
+          <p:cNvSpPr/>
+          <p:nvPr/>
+        </p:nvSpPr>
+        <p:spPr>
+          <a:xfrm>
+            <a:off x="5642273" y="1843180"/>
+            <a:ext cx="504056" cy="504056"/>
+          </a:xfrm>
+          <a:prstGeom prst="ellipse">
+            <a:avLst/>
+          </a:prstGeom>
+        </p:spPr>
+        <p:style>
+          <a:lnRef idx="2">
+            <a:schemeClr val="accent1"/>
+          </a:lnRef>
+          <a:fillRef idx="1">
+            <a:schemeClr val="lt1"/>
+          </a:fillRef>
+          <a:effectRef idx="0">
+            <a:schemeClr val="accent1"/>
+          </a:effectRef>
+          <a:fontRef idx="minor">
+            <a:schemeClr val="dk1"/>
+          </a:fontRef>
+        </p:style>
+        <p:txBody>
+          <a:bodyPr rtlCol="0" anchor="ctr"/>
+          <a:lstStyle/>
+          <a:p>
+            <a:pPr algn="ctr"/>
+            <a:r>
+              <a:rPr lang="en-US" altLang="ja-JP" sz="800" dirty="0" smtClean="0"/>
+              <a:t>2</a:t>
+            </a:r>
+            <a:endParaRPr lang="en-US" altLang="ja-JP" sz="800" dirty="0" smtClean="0"/>
+          </a:p>
+        </p:txBody>
+      </p:sp>
+      <p:sp>
+        <p:nvSpPr>
+          <p:cNvPr id="39" name="円/楕円 38"/>
+          <p:cNvSpPr/>
+          <p:nvPr/>
+        </p:nvSpPr>
+        <p:spPr>
+          <a:xfrm>
+            <a:off x="7677988" y="1843180"/>
+            <a:ext cx="504056" cy="504056"/>
+          </a:xfrm>
+          <a:prstGeom prst="ellipse">
+            <a:avLst/>
+          </a:prstGeom>
+        </p:spPr>
+        <p:style>
+          <a:lnRef idx="2">
+            <a:schemeClr val="accent1"/>
+          </a:lnRef>
+          <a:fillRef idx="1">
+            <a:schemeClr val="lt1"/>
+          </a:fillRef>
+          <a:effectRef idx="0">
+            <a:schemeClr val="accent1"/>
+          </a:effectRef>
+          <a:fontRef idx="minor">
+            <a:schemeClr val="dk1"/>
+          </a:fontRef>
+        </p:style>
+        <p:txBody>
+          <a:bodyPr rtlCol="0" anchor="ctr"/>
+          <a:lstStyle/>
+          <a:p>
+            <a:pPr algn="ctr"/>
+            <a:r>
+              <a:rPr lang="en-US" altLang="ja-JP" sz="800" dirty="0"/>
+              <a:t>4</a:t>
+            </a:r>
+            <a:endParaRPr lang="en-US" altLang="ja-JP" sz="800" dirty="0" smtClean="0"/>
+          </a:p>
+        </p:txBody>
+      </p:sp>
+      <p:cxnSp>
+        <p:nvCxnSpPr>
+          <p:cNvPr id="40" name="直線矢印コネクタ 39"/>
+          <p:cNvCxnSpPr>
+            <a:stCxn id="35" idx="6"/>
+            <a:endCxn id="37" idx="2"/>
+          </p:cNvCxnSpPr>
+          <p:nvPr/>
+        </p:nvCxnSpPr>
+        <p:spPr>
+          <a:xfrm>
+            <a:off x="5128472" y="2095208"/>
+            <a:ext cx="513801" cy="0"/>
+          </a:xfrm>
+          <a:prstGeom prst="straightConnector1">
+            <a:avLst/>
+          </a:prstGeom>
+          <a:ln>
+            <a:tailEnd type="arrow"/>
+          </a:ln>
+        </p:spPr>
+        <p:style>
+          <a:lnRef idx="1">
+            <a:schemeClr val="accent1"/>
+          </a:lnRef>
+          <a:fillRef idx="0">
+            <a:schemeClr val="accent1"/>
+          </a:fillRef>
+          <a:effectRef idx="0">
+            <a:schemeClr val="accent1"/>
+          </a:effectRef>
+          <a:fontRef idx="minor">
+            <a:schemeClr val="tx1"/>
+          </a:fontRef>
+        </p:style>
+      </p:cxnSp>
+      <p:cxnSp>
+        <p:nvCxnSpPr>
+          <p:cNvPr id="45" name="直線矢印コネクタ 44"/>
+          <p:cNvCxnSpPr>
+            <a:stCxn id="37" idx="6"/>
+            <a:endCxn id="36" idx="2"/>
+          </p:cNvCxnSpPr>
+          <p:nvPr/>
+        </p:nvCxnSpPr>
+        <p:spPr>
+          <a:xfrm>
+            <a:off x="6146329" y="2095208"/>
+            <a:ext cx="513801" cy="0"/>
+          </a:xfrm>
+          <a:prstGeom prst="straightConnector1">
+            <a:avLst/>
+          </a:prstGeom>
+          <a:ln>
+            <a:tailEnd type="arrow"/>
+          </a:ln>
+        </p:spPr>
+        <p:style>
+          <a:lnRef idx="1">
+            <a:schemeClr val="accent1"/>
+          </a:lnRef>
+          <a:fillRef idx="0">
+            <a:schemeClr val="accent1"/>
+          </a:fillRef>
+          <a:effectRef idx="0">
+            <a:schemeClr val="accent1"/>
+          </a:effectRef>
+          <a:fontRef idx="minor">
+            <a:schemeClr val="tx1"/>
+          </a:fontRef>
+        </p:style>
+      </p:cxnSp>
+      <p:cxnSp>
+        <p:nvCxnSpPr>
+          <p:cNvPr id="48" name="直線矢印コネクタ 47"/>
+          <p:cNvCxnSpPr>
+            <a:stCxn id="36" idx="6"/>
+            <a:endCxn id="39" idx="2"/>
+          </p:cNvCxnSpPr>
+          <p:nvPr/>
+        </p:nvCxnSpPr>
+        <p:spPr>
+          <a:xfrm>
+            <a:off x="7164186" y="2095208"/>
+            <a:ext cx="513802" cy="0"/>
+          </a:xfrm>
+          <a:prstGeom prst="straightConnector1">
+            <a:avLst/>
+          </a:prstGeom>
+          <a:ln>
+            <a:tailEnd type="arrow"/>
+          </a:ln>
+        </p:spPr>
+        <p:style>
+          <a:lnRef idx="1">
+            <a:schemeClr val="accent1"/>
+          </a:lnRef>
+          <a:fillRef idx="0">
+            <a:schemeClr val="accent1"/>
+          </a:fillRef>
+          <a:effectRef idx="0">
+            <a:schemeClr val="accent1"/>
+          </a:effectRef>
+          <a:fontRef idx="minor">
+            <a:schemeClr val="tx1"/>
+          </a:fontRef>
+        </p:style>
+      </p:cxnSp>
+      <p:cxnSp>
+        <p:nvCxnSpPr>
+          <p:cNvPr id="51" name="曲線コネクタ 50"/>
+          <p:cNvCxnSpPr>
+            <a:stCxn id="39" idx="6"/>
+            <a:endCxn id="35" idx="2"/>
+          </p:cNvCxnSpPr>
+          <p:nvPr/>
+        </p:nvCxnSpPr>
+        <p:spPr>
+          <a:xfrm flipH="1">
+            <a:off x="4624416" y="2095208"/>
+            <a:ext cx="3557628" cy="12700"/>
+          </a:xfrm>
+          <a:prstGeom prst="curvedConnector5">
+            <a:avLst>
+              <a:gd name="adj1" fmla="val -6426"/>
+              <a:gd name="adj2" fmla="val 3784472"/>
+              <a:gd name="adj3" fmla="val 106426"/>
             </a:avLst>
           </a:prstGeom>
           <a:ln>

</xml_diff>